<commit_message>
occ code and slides
</commit_message>
<xml_diff>
--- a/并发控制/cc_to/slides/cc_to.pptx
+++ b/并发控制/cc_to/slides/cc_to.pptx
@@ -10147,11 +10147,7 @@
             </a:r>
             <a:r>
               <a:rPr lang="zh-CN" altLang="en-US" dirty="0" smtClean="0"/>
-              <a:t>成功</a:t>
-            </a:r>
-            <a:r>
-              <a:rPr lang="zh-CN" altLang="en-US" dirty="0" smtClean="0"/>
-              <a:t>，再</a:t>
+              <a:t>成功，再</a:t>
             </a:r>
             <a:r>
               <a:rPr lang="zh-CN" altLang="en-US" dirty="0"/>
@@ -10304,7 +10300,7 @@
         <p:spPr/>
         <p:txBody>
           <a:bodyPr>
-            <a:normAutofit lnSpcReduction="10000"/>
+            <a:normAutofit/>
           </a:bodyPr>
           <a:lstStyle/>
           <a:p>
@@ -10397,12 +10393,12 @@
             <a:pPr lvl="2"/>
             <a:r>
               <a:rPr lang="zh-CN" altLang="en-US" dirty="0" smtClean="0"/>
-              <a:t>用于每执行一次写操作，更新相应的读和预写列表</a:t>
-            </a:r>
-            <a:endParaRPr lang="en-US" altLang="zh-CN" dirty="0" smtClean="0"/>
-          </a:p>
-          <a:p>
-            <a:pPr lvl="2"/>
+              <a:t>用于每执行一次写操作，更新相应的读和预写</a:t>
+            </a:r>
+            <a:r>
+              <a:rPr lang="zh-CN" altLang="en-US" dirty="0" smtClean="0"/>
+              <a:t>列表</a:t>
+            </a:r>
             <a:endParaRPr lang="en-US" altLang="zh-CN" dirty="0" smtClean="0"/>
           </a:p>
           <a:p>
@@ -10742,11 +10738,11 @@
           <a:p>
             <a:r>
               <a:rPr lang="en-US" altLang="zh-CN" dirty="0" smtClean="0"/>
-              <a:t>Timestamp Ordering</a:t>
-            </a:r>
-            <a:r>
-              <a:rPr lang="zh-CN" altLang="en-US" dirty="0" smtClean="0"/>
-              <a:t>简介</a:t>
+              <a:t>Timestamp </a:t>
+            </a:r>
+            <a:r>
+              <a:rPr lang="en-US" altLang="zh-CN" dirty="0" smtClean="0"/>
+              <a:t>Ordering</a:t>
             </a:r>
             <a:endParaRPr lang="zh-CN" altLang="en-US" dirty="0"/>
           </a:p>
@@ -11018,11 +11014,7 @@
             </a:r>
             <a:r>
               <a:rPr lang="en-US" altLang="zh-CN" sz="2800" dirty="0"/>
-              <a:t>abort &amp; </a:t>
-            </a:r>
-            <a:r>
-              <a:rPr lang="en-US" altLang="zh-CN" sz="2800" dirty="0"/>
-              <a:t>restart</a:t>
+              <a:t>abort &amp; restart</a:t>
             </a:r>
           </a:p>
           <a:p>
@@ -11290,11 +11282,7 @@
             </a:r>
             <a:r>
               <a:rPr lang="en-US" altLang="zh-CN" sz="2900" dirty="0"/>
-              <a:t>abort &amp; </a:t>
-            </a:r>
-            <a:r>
-              <a:rPr lang="en-US" altLang="zh-CN" sz="2900" dirty="0"/>
-              <a:t>restart</a:t>
+              <a:t>abort &amp; restart</a:t>
             </a:r>
           </a:p>
           <a:p>
@@ -11406,7 +11394,13 @@
           </a:p>
           <a:p>
             <a:r>
-              <a:rPr lang="en-US" altLang="zh-CN" b="1" u="sng" dirty="0" err="1">
+              <a:rPr lang="zh-CN" altLang="en-US" b="1" u="sng" dirty="0" smtClean="0">
+                <a:hlinkClick r:id="rId3"/>
+              </a:rPr>
+              <a:t>目录：</a:t>
+            </a:r>
+            <a:r>
+              <a:rPr lang="en-US" altLang="zh-CN" b="1" u="sng" dirty="0" err="1" smtClean="0">
                 <a:hlinkClick r:id="rId3"/>
               </a:rPr>
               <a:t>DaSE_DBMS_Implemention</a:t>
@@ -12424,11 +12418,7 @@
             </a:r>
             <a:r>
               <a:rPr lang="zh-CN" altLang="en-US" dirty="0" smtClean="0"/>
-              <a:t>增大，执行小于该时间戳的写</a:t>
-            </a:r>
-            <a:r>
-              <a:rPr lang="zh-CN" altLang="en-US" dirty="0" smtClean="0"/>
-              <a:t>操作</a:t>
+              <a:t>增大，执行小于该时间戳的写操作</a:t>
             </a:r>
             <a:endParaRPr lang="en-US" altLang="zh-CN" dirty="0" smtClean="0"/>
           </a:p>
@@ -12747,11 +12737,7 @@
             </a:r>
             <a:r>
               <a:rPr lang="zh-CN" altLang="en-US" dirty="0" smtClean="0"/>
-              <a:t>一事务</a:t>
-            </a:r>
-            <a:r>
-              <a:rPr lang="zh-CN" altLang="en-US" dirty="0" smtClean="0"/>
-              <a:t>后续的写失败导致之前的写撤销，引发一系列异常</a:t>
+              <a:t>一事务后续的写失败导致之前的写撤销，引发一系列异常</a:t>
             </a:r>
             <a:endParaRPr lang="en-US" altLang="zh-CN" dirty="0" smtClean="0"/>
           </a:p>

</xml_diff>